<commit_message>
Jeg har prøvd å bruke update inverse matrix fra lecture notes, men verdiene blir bare nan. Gikk videre for å se om jeg kunne få til metropolis ratio i stedet (har dermed endret funksjonen til å ta inn particle number i stedet for wavefunctionene + kommentert ut ratioen i importane sampling! + splittet opp updaten slik at det er kun slater matrix som blir oppdatert før godkjenningen av hoppet og dermed alri regnet ut hvis den ikke godkjennes!). Går det bra at jeg regner ut determinanten når jeg evaluerer invers? Jeg tror det fordi den brukes ikke i ratio-en lenger.
Fikk riktig energi med ny ratio, men den er nesten ingen kinetisk energi, kun potensiell...
</commit_message>
<xml_diff>
--- a/project_text/fig/states.pptx
+++ b/project_text/fig/states.pptx
@@ -6,6 +6,7 @@
   </p:sldMasterIdLst>
   <p:sldIdLst>
     <p:sldId id="256" r:id="rId2"/>
+    <p:sldId id="257" r:id="rId3"/>
   </p:sldIdLst>
   <p:sldSz cx="12192000" cy="6858000"/>
   <p:notesSz cx="6858000" cy="9144000"/>
@@ -104,6 +105,11 @@
       </a:defRPr>
     </a:lvl9pPr>
   </p:defaultTextStyle>
+  <p:extLst>
+    <p:ext uri="{EFAFB233-063F-42B5-8137-9DF3F51BA10A}">
+      <p15:sldGuideLst xmlns:p15="http://schemas.microsoft.com/office/powerpoint/2012/main"/>
+    </p:ext>
+  </p:extLst>
 </p:presentation>
 </file>
 
@@ -256,7 +262,7 @@
           <a:p>
             <a:fld id="{CC637E12-E285-46FA-93F6-1EC1CF25654F}" type="datetimeFigureOut">
               <a:rPr lang="en-US" smtClean="0"/>
-              <a:t>4/23/2020</a:t>
+              <a:t>5/27/2020</a:t>
             </a:fld>
             <a:endParaRPr lang="en-US"/>
           </a:p>
@@ -456,7 +462,7 @@
           <a:p>
             <a:fld id="{CC637E12-E285-46FA-93F6-1EC1CF25654F}" type="datetimeFigureOut">
               <a:rPr lang="en-US" smtClean="0"/>
-              <a:t>4/23/2020</a:t>
+              <a:t>5/27/2020</a:t>
             </a:fld>
             <a:endParaRPr lang="en-US"/>
           </a:p>
@@ -666,7 +672,7 @@
           <a:p>
             <a:fld id="{CC637E12-E285-46FA-93F6-1EC1CF25654F}" type="datetimeFigureOut">
               <a:rPr lang="en-US" smtClean="0"/>
-              <a:t>4/23/2020</a:t>
+              <a:t>5/27/2020</a:t>
             </a:fld>
             <a:endParaRPr lang="en-US"/>
           </a:p>
@@ -866,7 +872,7 @@
           <a:p>
             <a:fld id="{CC637E12-E285-46FA-93F6-1EC1CF25654F}" type="datetimeFigureOut">
               <a:rPr lang="en-US" smtClean="0"/>
-              <a:t>4/23/2020</a:t>
+              <a:t>5/27/2020</a:t>
             </a:fld>
             <a:endParaRPr lang="en-US"/>
           </a:p>
@@ -1142,7 +1148,7 @@
           <a:p>
             <a:fld id="{CC637E12-E285-46FA-93F6-1EC1CF25654F}" type="datetimeFigureOut">
               <a:rPr lang="en-US" smtClean="0"/>
-              <a:t>4/23/2020</a:t>
+              <a:t>5/27/2020</a:t>
             </a:fld>
             <a:endParaRPr lang="en-US"/>
           </a:p>
@@ -1410,7 +1416,7 @@
           <a:p>
             <a:fld id="{CC637E12-E285-46FA-93F6-1EC1CF25654F}" type="datetimeFigureOut">
               <a:rPr lang="en-US" smtClean="0"/>
-              <a:t>4/23/2020</a:t>
+              <a:t>5/27/2020</a:t>
             </a:fld>
             <a:endParaRPr lang="en-US"/>
           </a:p>
@@ -1825,7 +1831,7 @@
           <a:p>
             <a:fld id="{CC637E12-E285-46FA-93F6-1EC1CF25654F}" type="datetimeFigureOut">
               <a:rPr lang="en-US" smtClean="0"/>
-              <a:t>4/23/2020</a:t>
+              <a:t>5/27/2020</a:t>
             </a:fld>
             <a:endParaRPr lang="en-US"/>
           </a:p>
@@ -1967,7 +1973,7 @@
           <a:p>
             <a:fld id="{CC637E12-E285-46FA-93F6-1EC1CF25654F}" type="datetimeFigureOut">
               <a:rPr lang="en-US" smtClean="0"/>
-              <a:t>4/23/2020</a:t>
+              <a:t>5/27/2020</a:t>
             </a:fld>
             <a:endParaRPr lang="en-US"/>
           </a:p>
@@ -2080,7 +2086,7 @@
           <a:p>
             <a:fld id="{CC637E12-E285-46FA-93F6-1EC1CF25654F}" type="datetimeFigureOut">
               <a:rPr lang="en-US" smtClean="0"/>
-              <a:t>4/23/2020</a:t>
+              <a:t>5/27/2020</a:t>
             </a:fld>
             <a:endParaRPr lang="en-US"/>
           </a:p>
@@ -2393,7 +2399,7 @@
           <a:p>
             <a:fld id="{CC637E12-E285-46FA-93F6-1EC1CF25654F}" type="datetimeFigureOut">
               <a:rPr lang="en-US" smtClean="0"/>
-              <a:t>4/23/2020</a:t>
+              <a:t>5/27/2020</a:t>
             </a:fld>
             <a:endParaRPr lang="en-US"/>
           </a:p>
@@ -2682,7 +2688,7 @@
           <a:p>
             <a:fld id="{CC637E12-E285-46FA-93F6-1EC1CF25654F}" type="datetimeFigureOut">
               <a:rPr lang="en-US" smtClean="0"/>
-              <a:t>4/23/2020</a:t>
+              <a:t>5/27/2020</a:t>
             </a:fld>
             <a:endParaRPr lang="en-US"/>
           </a:p>
@@ -2925,7 +2931,7 @@
           <a:p>
             <a:fld id="{CC637E12-E285-46FA-93F6-1EC1CF25654F}" type="datetimeFigureOut">
               <a:rPr lang="en-US" smtClean="0"/>
-              <a:t>4/23/2020</a:t>
+              <a:t>5/27/2020</a:t>
             </a:fld>
             <a:endParaRPr lang="en-US"/>
           </a:p>
@@ -6036,6 +6042,746 @@
 </p:sld>
 </file>
 
+<file path=ppt/slides/slide2.xml><?xml version="1.0" encoding="utf-8"?>
+<p:sld xmlns:a="http://schemas.openxmlformats.org/drawingml/2006/main" xmlns:r="http://schemas.openxmlformats.org/officeDocument/2006/relationships" xmlns:p="http://schemas.openxmlformats.org/presentationml/2006/main">
+  <p:cSld>
+    <p:spTree>
+      <p:nvGrpSpPr>
+        <p:cNvPr id="1" name=""/>
+        <p:cNvGrpSpPr/>
+        <p:nvPr/>
+      </p:nvGrpSpPr>
+      <p:grpSpPr>
+        <a:xfrm>
+          <a:off x="0" y="0"/>
+          <a:ext cx="0" cy="0"/>
+          <a:chOff x="0" y="0"/>
+          <a:chExt cx="0" cy="0"/>
+        </a:xfrm>
+      </p:grpSpPr>
+      <p:sp>
+        <p:nvSpPr>
+          <p:cNvPr id="4" name="Rektangel 3">
+            <a:extLst>
+              <a:ext uri="{FF2B5EF4-FFF2-40B4-BE49-F238E27FC236}">
+                <a16:creationId xmlns:a16="http://schemas.microsoft.com/office/drawing/2014/main" id="{DC908C8F-43A3-4552-B4EB-043993B2F861}"/>
+              </a:ext>
+            </a:extLst>
+          </p:cNvPr>
+          <p:cNvSpPr/>
+          <p:nvPr/>
+        </p:nvSpPr>
+        <p:spPr>
+          <a:xfrm>
+            <a:off x="2028825" y="1533525"/>
+            <a:ext cx="3990975" cy="2514600"/>
+          </a:xfrm>
+          <a:prstGeom prst="rect">
+            <a:avLst/>
+          </a:prstGeom>
+          <a:solidFill>
+            <a:schemeClr val="bg1"/>
+          </a:solidFill>
+          <a:ln>
+            <a:solidFill>
+              <a:schemeClr val="bg1"/>
+            </a:solidFill>
+          </a:ln>
+        </p:spPr>
+        <p:style>
+          <a:lnRef idx="2">
+            <a:schemeClr val="accent1">
+              <a:shade val="50000"/>
+            </a:schemeClr>
+          </a:lnRef>
+          <a:fillRef idx="1">
+            <a:schemeClr val="accent1"/>
+          </a:fillRef>
+          <a:effectRef idx="0">
+            <a:schemeClr val="accent1"/>
+          </a:effectRef>
+          <a:fontRef idx="minor">
+            <a:schemeClr val="lt1"/>
+          </a:fontRef>
+        </p:style>
+        <p:txBody>
+          <a:bodyPr rtlCol="0" anchor="ctr"/>
+          <a:lstStyle/>
+          <a:p>
+            <a:pPr algn="ctr"/>
+            <a:endParaRPr lang="en-US"/>
+          </a:p>
+        </p:txBody>
+      </p:sp>
+      <p:pic>
+        <p:nvPicPr>
+          <p:cNvPr id="5" name="Bilde 4">
+            <a:extLst>
+              <a:ext uri="{FF2B5EF4-FFF2-40B4-BE49-F238E27FC236}">
+                <a16:creationId xmlns:a16="http://schemas.microsoft.com/office/drawing/2014/main" id="{1DA7A485-D412-442A-94D3-38F32FA03D76}"/>
+              </a:ext>
+            </a:extLst>
+          </p:cNvPr>
+          <p:cNvPicPr>
+            <a:picLocks noChangeAspect="1"/>
+          </p:cNvPicPr>
+          <p:nvPr/>
+        </p:nvPicPr>
+        <p:blipFill rotWithShape="1">
+          <a:blip r:embed="rId2">
+            <a:extLst>
+              <a:ext uri="{28A0092B-C50C-407E-A947-70E740481C1C}">
+                <a14:useLocalDpi xmlns:a14="http://schemas.microsoft.com/office/drawing/2010/main" val="0"/>
+              </a:ext>
+            </a:extLst>
+          </a:blip>
+          <a:srcRect l="26031" t="8972"/>
+          <a:stretch/>
+        </p:blipFill>
+        <p:spPr>
+          <a:xfrm>
+            <a:off x="2195661" y="1756477"/>
+            <a:ext cx="979463" cy="1309409"/>
+          </a:xfrm>
+          <a:prstGeom prst="rect">
+            <a:avLst/>
+          </a:prstGeom>
+        </p:spPr>
+      </p:pic>
+      <p:sp>
+        <p:nvSpPr>
+          <p:cNvPr id="6" name="Ellipse 5">
+            <a:extLst>
+              <a:ext uri="{FF2B5EF4-FFF2-40B4-BE49-F238E27FC236}">
+                <a16:creationId xmlns:a16="http://schemas.microsoft.com/office/drawing/2014/main" id="{10CDDF3D-A6B6-4391-9B82-376C47BE1FE9}"/>
+              </a:ext>
+            </a:extLst>
+          </p:cNvPr>
+          <p:cNvSpPr/>
+          <p:nvPr/>
+        </p:nvSpPr>
+        <p:spPr>
+          <a:xfrm>
+            <a:off x="2847012" y="2001778"/>
+            <a:ext cx="322412" cy="355345"/>
+          </a:xfrm>
+          <a:prstGeom prst="ellipse">
+            <a:avLst/>
+          </a:prstGeom>
+          <a:solidFill>
+            <a:schemeClr val="accent1">
+              <a:alpha val="50000"/>
+            </a:schemeClr>
+          </a:solidFill>
+          <a:ln>
+            <a:noFill/>
+          </a:ln>
+        </p:spPr>
+        <p:style>
+          <a:lnRef idx="0">
+            <a:scrgbClr r="0" g="0" b="0"/>
+          </a:lnRef>
+          <a:fillRef idx="0">
+            <a:scrgbClr r="0" g="0" b="0"/>
+          </a:fillRef>
+          <a:effectRef idx="0">
+            <a:scrgbClr r="0" g="0" b="0"/>
+          </a:effectRef>
+          <a:fontRef idx="minor">
+            <a:schemeClr val="lt1"/>
+          </a:fontRef>
+        </p:style>
+        <p:txBody>
+          <a:bodyPr rtlCol="0" anchor="ctr"/>
+          <a:lstStyle/>
+          <a:p>
+            <a:pPr algn="ctr"/>
+            <a:endParaRPr lang="en-US"/>
+          </a:p>
+        </p:txBody>
+      </p:sp>
+      <p:sp>
+        <p:nvSpPr>
+          <p:cNvPr id="7" name="Ellipse 6">
+            <a:extLst>
+              <a:ext uri="{FF2B5EF4-FFF2-40B4-BE49-F238E27FC236}">
+                <a16:creationId xmlns:a16="http://schemas.microsoft.com/office/drawing/2014/main" id="{424AE941-3EBA-4A37-8BAD-989B163DE05D}"/>
+              </a:ext>
+            </a:extLst>
+          </p:cNvPr>
+          <p:cNvSpPr/>
+          <p:nvPr/>
+        </p:nvSpPr>
+        <p:spPr>
+          <a:xfrm>
+            <a:off x="2904627" y="2376146"/>
+            <a:ext cx="322412" cy="355344"/>
+          </a:xfrm>
+          <a:prstGeom prst="ellipse">
+            <a:avLst/>
+          </a:prstGeom>
+          <a:solidFill>
+            <a:schemeClr val="accent2">
+              <a:alpha val="50000"/>
+            </a:schemeClr>
+          </a:solidFill>
+          <a:ln>
+            <a:noFill/>
+          </a:ln>
+        </p:spPr>
+        <p:style>
+          <a:lnRef idx="0">
+            <a:scrgbClr r="0" g="0" b="0"/>
+          </a:lnRef>
+          <a:fillRef idx="0">
+            <a:scrgbClr r="0" g="0" b="0"/>
+          </a:fillRef>
+          <a:effectRef idx="0">
+            <a:scrgbClr r="0" g="0" b="0"/>
+          </a:effectRef>
+          <a:fontRef idx="minor">
+            <a:schemeClr val="lt1"/>
+          </a:fontRef>
+        </p:style>
+        <p:txBody>
+          <a:bodyPr rtlCol="0" anchor="ctr"/>
+          <a:lstStyle/>
+          <a:p>
+            <a:pPr algn="ctr"/>
+            <a:endParaRPr lang="en-US"/>
+          </a:p>
+        </p:txBody>
+      </p:sp>
+      <p:sp>
+        <p:nvSpPr>
+          <p:cNvPr id="8" name="Ellipse 7">
+            <a:extLst>
+              <a:ext uri="{FF2B5EF4-FFF2-40B4-BE49-F238E27FC236}">
+                <a16:creationId xmlns:a16="http://schemas.microsoft.com/office/drawing/2014/main" id="{921B2798-5EBF-49DC-90FC-5BD7BCC442B1}"/>
+              </a:ext>
+            </a:extLst>
+          </p:cNvPr>
+          <p:cNvSpPr/>
+          <p:nvPr/>
+        </p:nvSpPr>
+        <p:spPr>
+          <a:xfrm>
+            <a:off x="2642517" y="2375523"/>
+            <a:ext cx="322412" cy="355344"/>
+          </a:xfrm>
+          <a:prstGeom prst="ellipse">
+            <a:avLst/>
+          </a:prstGeom>
+          <a:solidFill>
+            <a:schemeClr val="accent4">
+              <a:alpha val="50000"/>
+            </a:schemeClr>
+          </a:solidFill>
+          <a:ln>
+            <a:noFill/>
+          </a:ln>
+        </p:spPr>
+        <p:style>
+          <a:lnRef idx="0">
+            <a:scrgbClr r="0" g="0" b="0"/>
+          </a:lnRef>
+          <a:fillRef idx="0">
+            <a:scrgbClr r="0" g="0" b="0"/>
+          </a:fillRef>
+          <a:effectRef idx="0">
+            <a:scrgbClr r="0" g="0" b="0"/>
+          </a:effectRef>
+          <a:fontRef idx="minor">
+            <a:schemeClr val="lt1"/>
+          </a:fontRef>
+        </p:style>
+        <p:txBody>
+          <a:bodyPr rtlCol="0" anchor="ctr"/>
+          <a:lstStyle/>
+          <a:p>
+            <a:pPr algn="ctr"/>
+            <a:endParaRPr lang="en-US"/>
+          </a:p>
+        </p:txBody>
+      </p:sp>
+      <p:sp>
+        <p:nvSpPr>
+          <p:cNvPr id="9" name="TekstSylinder 8">
+            <a:extLst>
+              <a:ext uri="{FF2B5EF4-FFF2-40B4-BE49-F238E27FC236}">
+                <a16:creationId xmlns:a16="http://schemas.microsoft.com/office/drawing/2014/main" id="{BD89360B-FEC9-4270-A37D-604E591E279F}"/>
+              </a:ext>
+            </a:extLst>
+          </p:cNvPr>
+          <p:cNvSpPr txBox="1"/>
+          <p:nvPr/>
+        </p:nvSpPr>
+        <p:spPr>
+          <a:xfrm>
+            <a:off x="3489149" y="2085305"/>
+            <a:ext cx="2357306" cy="646331"/>
+          </a:xfrm>
+          <a:prstGeom prst="rect">
+            <a:avLst/>
+          </a:prstGeom>
+        </p:spPr>
+        <p:style>
+          <a:lnRef idx="2">
+            <a:schemeClr val="accent1"/>
+          </a:lnRef>
+          <a:fillRef idx="1">
+            <a:schemeClr val="lt1"/>
+          </a:fillRef>
+          <a:effectRef idx="0">
+            <a:schemeClr val="accent1"/>
+          </a:effectRef>
+          <a:fontRef idx="minor">
+            <a:schemeClr val="dk1"/>
+          </a:fontRef>
+        </p:style>
+        <p:txBody>
+          <a:bodyPr wrap="square" rtlCol="0">
+            <a:spAutoFit/>
+          </a:bodyPr>
+          <a:lstStyle/>
+          <a:p>
+            <a:r>
+              <a:rPr lang="en-US" dirty="0"/>
+              <a:t>Element in the inverse of the Slater Matrix</a:t>
+            </a:r>
+          </a:p>
+        </p:txBody>
+      </p:sp>
+      <p:sp>
+        <p:nvSpPr>
+          <p:cNvPr id="10" name="TekstSylinder 9">
+            <a:extLst>
+              <a:ext uri="{FF2B5EF4-FFF2-40B4-BE49-F238E27FC236}">
+                <a16:creationId xmlns:a16="http://schemas.microsoft.com/office/drawing/2014/main" id="{4B450C68-6D38-474C-AEB4-F14797CBFDC9}"/>
+              </a:ext>
+            </a:extLst>
+          </p:cNvPr>
+          <p:cNvSpPr txBox="1"/>
+          <p:nvPr/>
+        </p:nvSpPr>
+        <p:spPr>
+          <a:xfrm>
+            <a:off x="2195662" y="2975724"/>
+            <a:ext cx="1839501" cy="923330"/>
+          </a:xfrm>
+          <a:prstGeom prst="rect">
+            <a:avLst/>
+          </a:prstGeom>
+        </p:spPr>
+        <p:style>
+          <a:lnRef idx="2">
+            <a:schemeClr val="accent4"/>
+          </a:lnRef>
+          <a:fillRef idx="1">
+            <a:schemeClr val="lt1"/>
+          </a:fillRef>
+          <a:effectRef idx="0">
+            <a:schemeClr val="accent4"/>
+          </a:effectRef>
+          <a:fontRef idx="minor">
+            <a:schemeClr val="dk1"/>
+          </a:fontRef>
+        </p:style>
+        <p:txBody>
+          <a:bodyPr wrap="square" rtlCol="0">
+            <a:spAutoFit/>
+          </a:bodyPr>
+          <a:lstStyle/>
+          <a:p>
+            <a:r>
+              <a:rPr lang="en-US" dirty="0"/>
+              <a:t>Evaluated for the k-</a:t>
+            </a:r>
+            <a:r>
+              <a:rPr lang="en-US" dirty="0" err="1"/>
+              <a:t>th</a:t>
+            </a:r>
+            <a:r>
+              <a:rPr lang="en-US" dirty="0"/>
+              <a:t> particle at position </a:t>
+            </a:r>
+            <a:r>
+              <a:rPr lang="en-US" b="1" dirty="0" err="1"/>
+              <a:t>r</a:t>
+            </a:r>
+            <a:r>
+              <a:rPr lang="en-US" baseline="-25000" dirty="0" err="1"/>
+              <a:t>j</a:t>
+            </a:r>
+            <a:endParaRPr lang="en-US" baseline="-25000" dirty="0"/>
+          </a:p>
+        </p:txBody>
+      </p:sp>
+      <p:sp>
+        <p:nvSpPr>
+          <p:cNvPr id="11" name="TekstSylinder 10">
+            <a:extLst>
+              <a:ext uri="{FF2B5EF4-FFF2-40B4-BE49-F238E27FC236}">
+                <a16:creationId xmlns:a16="http://schemas.microsoft.com/office/drawing/2014/main" id="{26D37D28-7509-425F-B6CB-3F56E46C9CF8}"/>
+              </a:ext>
+            </a:extLst>
+          </p:cNvPr>
+          <p:cNvSpPr txBox="1"/>
+          <p:nvPr/>
+        </p:nvSpPr>
+        <p:spPr>
+          <a:xfrm>
+            <a:off x="4219022" y="2967335"/>
+            <a:ext cx="1616919" cy="923330"/>
+          </a:xfrm>
+          <a:prstGeom prst="rect">
+            <a:avLst/>
+          </a:prstGeom>
+          <a:ln>
+            <a:headEnd type="none" w="med" len="med"/>
+            <a:tailEnd type="none" w="med" len="med"/>
+          </a:ln>
+        </p:spPr>
+        <p:style>
+          <a:lnRef idx="2">
+            <a:schemeClr val="accent2"/>
+          </a:lnRef>
+          <a:fillRef idx="1">
+            <a:schemeClr val="lt1"/>
+          </a:fillRef>
+          <a:effectRef idx="0">
+            <a:schemeClr val="accent2"/>
+          </a:effectRef>
+          <a:fontRef idx="minor">
+            <a:schemeClr val="dk1"/>
+          </a:fontRef>
+        </p:style>
+        <p:txBody>
+          <a:bodyPr wrap="square" rtlCol="0">
+            <a:spAutoFit/>
+          </a:bodyPr>
+          <a:lstStyle/>
+          <a:p>
+            <a:r>
+              <a:rPr lang="en-US" dirty="0"/>
+              <a:t>The j-</a:t>
+            </a:r>
+            <a:r>
+              <a:rPr lang="en-US" dirty="0" err="1"/>
+              <a:t>th</a:t>
+            </a:r>
+            <a:r>
+              <a:rPr lang="en-US" dirty="0"/>
+              <a:t> single particle wavefunction</a:t>
+            </a:r>
+          </a:p>
+        </p:txBody>
+      </p:sp>
+      <p:sp>
+        <p:nvSpPr>
+          <p:cNvPr id="12" name="Frihåndsform: figur 11">
+            <a:extLst>
+              <a:ext uri="{FF2B5EF4-FFF2-40B4-BE49-F238E27FC236}">
+                <a16:creationId xmlns:a16="http://schemas.microsoft.com/office/drawing/2014/main" id="{FE8746E1-AC45-44A6-9942-9BAC8CFFC689}"/>
+              </a:ext>
+            </a:extLst>
+          </p:cNvPr>
+          <p:cNvSpPr/>
+          <p:nvPr/>
+        </p:nvSpPr>
+        <p:spPr>
+          <a:xfrm>
+            <a:off x="3120705" y="1761676"/>
+            <a:ext cx="637563" cy="234904"/>
+          </a:xfrm>
+          <a:custGeom>
+            <a:avLst/>
+            <a:gdLst>
+              <a:gd name="connsiteX0" fmla="*/ 0 w 637563"/>
+              <a:gd name="connsiteY0" fmla="*/ 226515 h 234904"/>
+              <a:gd name="connsiteX1" fmla="*/ 402671 w 637563"/>
+              <a:gd name="connsiteY1" fmla="*/ 12 h 234904"/>
+              <a:gd name="connsiteX2" fmla="*/ 637563 w 637563"/>
+              <a:gd name="connsiteY2" fmla="*/ 234904 h 234904"/>
+            </a:gdLst>
+            <a:ahLst/>
+            <a:cxnLst>
+              <a:cxn ang="0">
+                <a:pos x="connsiteX0" y="connsiteY0"/>
+              </a:cxn>
+              <a:cxn ang="0">
+                <a:pos x="connsiteX1" y="connsiteY1"/>
+              </a:cxn>
+              <a:cxn ang="0">
+                <a:pos x="connsiteX2" y="connsiteY2"/>
+              </a:cxn>
+            </a:cxnLst>
+            <a:rect l="l" t="t" r="r" b="b"/>
+            <a:pathLst>
+              <a:path w="637563" h="234904">
+                <a:moveTo>
+                  <a:pt x="0" y="226515"/>
+                </a:moveTo>
+                <a:cubicBezTo>
+                  <a:pt x="148205" y="112564"/>
+                  <a:pt x="296411" y="-1386"/>
+                  <a:pt x="402671" y="12"/>
+                </a:cubicBezTo>
+                <a:cubicBezTo>
+                  <a:pt x="508931" y="1410"/>
+                  <a:pt x="573247" y="118157"/>
+                  <a:pt x="637563" y="234904"/>
+                </a:cubicBezTo>
+              </a:path>
+            </a:pathLst>
+          </a:custGeom>
+          <a:ln>
+            <a:headEnd type="none" w="med" len="med"/>
+            <a:tailEnd type="arrow" w="med" len="med"/>
+          </a:ln>
+        </p:spPr>
+        <p:style>
+          <a:lnRef idx="1">
+            <a:schemeClr val="accent1"/>
+          </a:lnRef>
+          <a:fillRef idx="0">
+            <a:schemeClr val="accent1"/>
+          </a:fillRef>
+          <a:effectRef idx="0">
+            <a:schemeClr val="accent1"/>
+          </a:effectRef>
+          <a:fontRef idx="minor">
+            <a:schemeClr val="tx1"/>
+          </a:fontRef>
+        </p:style>
+        <p:txBody>
+          <a:bodyPr rtlCol="0" anchor="ctr"/>
+          <a:lstStyle/>
+          <a:p>
+            <a:pPr algn="ctr"/>
+            <a:endParaRPr lang="en-US"/>
+          </a:p>
+        </p:txBody>
+      </p:sp>
+      <p:sp>
+        <p:nvSpPr>
+          <p:cNvPr id="13" name="Frihåndsform: figur 12">
+            <a:extLst>
+              <a:ext uri="{FF2B5EF4-FFF2-40B4-BE49-F238E27FC236}">
+                <a16:creationId xmlns:a16="http://schemas.microsoft.com/office/drawing/2014/main" id="{625FE29D-CF34-4119-8BA7-D70D32E8B230}"/>
+              </a:ext>
+            </a:extLst>
+          </p:cNvPr>
+          <p:cNvSpPr/>
+          <p:nvPr/>
+        </p:nvSpPr>
+        <p:spPr>
+          <a:xfrm>
+            <a:off x="3212984" y="2701243"/>
+            <a:ext cx="1116584" cy="237982"/>
+          </a:xfrm>
+          <a:custGeom>
+            <a:avLst/>
+            <a:gdLst>
+              <a:gd name="connsiteX0" fmla="*/ 0 w 1023457"/>
+              <a:gd name="connsiteY0" fmla="*/ 0 h 184558"/>
+              <a:gd name="connsiteX1" fmla="*/ 369116 w 1023457"/>
+              <a:gd name="connsiteY1" fmla="*/ 151002 h 184558"/>
+              <a:gd name="connsiteX2" fmla="*/ 906011 w 1023457"/>
+              <a:gd name="connsiteY2" fmla="*/ 109057 h 184558"/>
+              <a:gd name="connsiteX3" fmla="*/ 1023457 w 1023457"/>
+              <a:gd name="connsiteY3" fmla="*/ 184558 h 184558"/>
+              <a:gd name="connsiteX0" fmla="*/ 0 w 1107347"/>
+              <a:gd name="connsiteY0" fmla="*/ 0 h 218114"/>
+              <a:gd name="connsiteX1" fmla="*/ 369116 w 1107347"/>
+              <a:gd name="connsiteY1" fmla="*/ 151002 h 218114"/>
+              <a:gd name="connsiteX2" fmla="*/ 906011 w 1107347"/>
+              <a:gd name="connsiteY2" fmla="*/ 109057 h 218114"/>
+              <a:gd name="connsiteX3" fmla="*/ 1107347 w 1107347"/>
+              <a:gd name="connsiteY3" fmla="*/ 218114 h 218114"/>
+              <a:gd name="connsiteX0" fmla="*/ 0 w 1116584"/>
+              <a:gd name="connsiteY0" fmla="*/ 0 h 220972"/>
+              <a:gd name="connsiteX1" fmla="*/ 369116 w 1116584"/>
+              <a:gd name="connsiteY1" fmla="*/ 151002 h 220972"/>
+              <a:gd name="connsiteX2" fmla="*/ 906011 w 1116584"/>
+              <a:gd name="connsiteY2" fmla="*/ 109057 h 220972"/>
+              <a:gd name="connsiteX3" fmla="*/ 1116584 w 1116584"/>
+              <a:gd name="connsiteY3" fmla="*/ 220972 h 220972"/>
+              <a:gd name="connsiteX0" fmla="*/ 0 w 1116584"/>
+              <a:gd name="connsiteY0" fmla="*/ 0 h 220972"/>
+              <a:gd name="connsiteX1" fmla="*/ 369116 w 1116584"/>
+              <a:gd name="connsiteY1" fmla="*/ 151002 h 220972"/>
+              <a:gd name="connsiteX2" fmla="*/ 906011 w 1116584"/>
+              <a:gd name="connsiteY2" fmla="*/ 109057 h 220972"/>
+              <a:gd name="connsiteX3" fmla="*/ 1116584 w 1116584"/>
+              <a:gd name="connsiteY3" fmla="*/ 220972 h 220972"/>
+            </a:gdLst>
+            <a:ahLst/>
+            <a:cxnLst>
+              <a:cxn ang="0">
+                <a:pos x="connsiteX0" y="connsiteY0"/>
+              </a:cxn>
+              <a:cxn ang="0">
+                <a:pos x="connsiteX1" y="connsiteY1"/>
+              </a:cxn>
+              <a:cxn ang="0">
+                <a:pos x="connsiteX2" y="connsiteY2"/>
+              </a:cxn>
+              <a:cxn ang="0">
+                <a:pos x="connsiteX3" y="connsiteY3"/>
+              </a:cxn>
+            </a:cxnLst>
+            <a:rect l="l" t="t" r="r" b="b"/>
+            <a:pathLst>
+              <a:path w="1116584" h="220972">
+                <a:moveTo>
+                  <a:pt x="0" y="0"/>
+                </a:moveTo>
+                <a:cubicBezTo>
+                  <a:pt x="109057" y="66413"/>
+                  <a:pt x="218114" y="132826"/>
+                  <a:pt x="369116" y="151002"/>
+                </a:cubicBezTo>
+                <a:cubicBezTo>
+                  <a:pt x="520118" y="169178"/>
+                  <a:pt x="796954" y="103464"/>
+                  <a:pt x="906011" y="109057"/>
+                </a:cubicBezTo>
+                <a:cubicBezTo>
+                  <a:pt x="1015068" y="114650"/>
+                  <a:pt x="1069286" y="160289"/>
+                  <a:pt x="1116584" y="220972"/>
+                </a:cubicBezTo>
+              </a:path>
+            </a:pathLst>
+          </a:custGeom>
+          <a:ln>
+            <a:headEnd type="none" w="med" len="med"/>
+            <a:tailEnd type="arrow" w="med" len="med"/>
+          </a:ln>
+        </p:spPr>
+        <p:style>
+          <a:lnRef idx="1">
+            <a:schemeClr val="accent2"/>
+          </a:lnRef>
+          <a:fillRef idx="0">
+            <a:schemeClr val="accent2"/>
+          </a:fillRef>
+          <a:effectRef idx="0">
+            <a:schemeClr val="accent2"/>
+          </a:effectRef>
+          <a:fontRef idx="minor">
+            <a:schemeClr val="tx1"/>
+          </a:fontRef>
+        </p:style>
+        <p:txBody>
+          <a:bodyPr rtlCol="0" anchor="ctr"/>
+          <a:lstStyle/>
+          <a:p>
+            <a:pPr algn="ctr"/>
+            <a:endParaRPr lang="en-US"/>
+          </a:p>
+        </p:txBody>
+      </p:sp>
+      <p:sp>
+        <p:nvSpPr>
+          <p:cNvPr id="14" name="Frihåndsform: figur 13">
+            <a:extLst>
+              <a:ext uri="{FF2B5EF4-FFF2-40B4-BE49-F238E27FC236}">
+                <a16:creationId xmlns:a16="http://schemas.microsoft.com/office/drawing/2014/main" id="{71CD1E29-3389-4D37-B893-68D7E432C887}"/>
+              </a:ext>
+            </a:extLst>
+          </p:cNvPr>
+          <p:cNvSpPr/>
+          <p:nvPr/>
+        </p:nvSpPr>
+        <p:spPr>
+          <a:xfrm>
+            <a:off x="2464711" y="2634143"/>
+            <a:ext cx="152654" cy="293615"/>
+          </a:xfrm>
+          <a:custGeom>
+            <a:avLst/>
+            <a:gdLst>
+              <a:gd name="connsiteX0" fmla="*/ 152654 w 152654"/>
+              <a:gd name="connsiteY0" fmla="*/ 0 h 293615"/>
+              <a:gd name="connsiteX1" fmla="*/ 1652 w 152654"/>
+              <a:gd name="connsiteY1" fmla="*/ 125835 h 293615"/>
+              <a:gd name="connsiteX2" fmla="*/ 85542 w 152654"/>
+              <a:gd name="connsiteY2" fmla="*/ 293615 h 293615"/>
+            </a:gdLst>
+            <a:ahLst/>
+            <a:cxnLst>
+              <a:cxn ang="0">
+                <a:pos x="connsiteX0" y="connsiteY0"/>
+              </a:cxn>
+              <a:cxn ang="0">
+                <a:pos x="connsiteX1" y="connsiteY1"/>
+              </a:cxn>
+              <a:cxn ang="0">
+                <a:pos x="connsiteX2" y="connsiteY2"/>
+              </a:cxn>
+            </a:cxnLst>
+            <a:rect l="l" t="t" r="r" b="b"/>
+            <a:pathLst>
+              <a:path w="152654" h="293615">
+                <a:moveTo>
+                  <a:pt x="152654" y="0"/>
+                </a:moveTo>
+                <a:cubicBezTo>
+                  <a:pt x="82745" y="38449"/>
+                  <a:pt x="12837" y="76899"/>
+                  <a:pt x="1652" y="125835"/>
+                </a:cubicBezTo>
+                <a:cubicBezTo>
+                  <a:pt x="-9533" y="174771"/>
+                  <a:pt x="38004" y="234193"/>
+                  <a:pt x="85542" y="293615"/>
+                </a:cubicBezTo>
+              </a:path>
+            </a:pathLst>
+          </a:custGeom>
+          <a:ln>
+            <a:headEnd type="none" w="med" len="med"/>
+            <a:tailEnd type="arrow" w="med" len="med"/>
+          </a:ln>
+        </p:spPr>
+        <p:style>
+          <a:lnRef idx="1">
+            <a:schemeClr val="accent4"/>
+          </a:lnRef>
+          <a:fillRef idx="0">
+            <a:schemeClr val="accent4"/>
+          </a:fillRef>
+          <a:effectRef idx="0">
+            <a:schemeClr val="accent4"/>
+          </a:effectRef>
+          <a:fontRef idx="minor">
+            <a:schemeClr val="tx1"/>
+          </a:fontRef>
+        </p:style>
+        <p:txBody>
+          <a:bodyPr rtlCol="0" anchor="ctr"/>
+          <a:lstStyle/>
+          <a:p>
+            <a:pPr algn="ctr"/>
+            <a:endParaRPr lang="en-US"/>
+          </a:p>
+        </p:txBody>
+      </p:sp>
+    </p:spTree>
+    <p:extLst>
+      <p:ext uri="{BB962C8B-B14F-4D97-AF65-F5344CB8AC3E}">
+        <p14:creationId xmlns:p14="http://schemas.microsoft.com/office/powerpoint/2010/main" val="1493597922"/>
+      </p:ext>
+    </p:extLst>
+  </p:cSld>
+  <p:clrMapOvr>
+    <a:masterClrMapping/>
+  </p:clrMapOvr>
+</p:sld>
+</file>
+
 <file path=ppt/theme/theme1.xml><?xml version="1.0" encoding="utf-8"?>
 <a:theme xmlns:a="http://schemas.openxmlformats.org/drawingml/2006/main" name="Office-tema">
   <a:themeElements>

</xml_diff>